<commit_message>
ppt 수정 lamp btn
</commit_message>
<xml_diff>
--- a/DsDotNet/src/UnitTest/UnitTest.Engine/ImportOffice/Sample/s.pptx
+++ b/DsDotNet/src/UnitTest/UnitTest.Engine/ImportOffice/Sample/s.pptx
@@ -227,7 +227,7 @@
           <a:p>
             <a:fld id="{DD503887-5801-43A0-AEF9-041E8DDC2558}" type="datetimeFigureOut">
               <a:rPr lang="ko-KR" altLang="en-US" smtClean="0"/>
-              <a:t>2022-12-21</a:t>
+              <a:t>2022-12-28</a:t>
             </a:fld>
             <a:endParaRPr lang="ko-KR" altLang="en-US" dirty="0"/>
           </a:p>
@@ -404,7 +404,7 @@
           <a:p>
             <a:fld id="{95336A0E-57B1-4D4C-BD9B-2F72B5943464}" type="datetimeFigureOut">
               <a:rPr lang="ko-KR" altLang="en-US" smtClean="0"/>
-              <a:t>2022-12-21</a:t>
+              <a:t>2022-12-28</a:t>
             </a:fld>
             <a:endParaRPr lang="ko-KR" altLang="en-US" dirty="0"/>
           </a:p>
@@ -902,7 +902,7 @@
           <a:p>
             <a:fld id="{229D12C7-0FF5-4972-A033-474EFFC79F40}" type="datetime1">
               <a:rPr lang="ko-KR" altLang="en-US" smtClean="0"/>
-              <a:t>2022-12-21</a:t>
+              <a:t>2022-12-28</a:t>
             </a:fld>
             <a:endParaRPr lang="ko-KR" altLang="en-US" dirty="0"/>
           </a:p>
@@ -1100,7 +1100,7 @@
           <a:p>
             <a:fld id="{5BA19FD4-B052-4F56-8FD8-EAFD078DEFB0}" type="datetime1">
               <a:rPr lang="ko-KR" altLang="en-US" smtClean="0"/>
-              <a:t>2022-12-21</a:t>
+              <a:t>2022-12-28</a:t>
             </a:fld>
             <a:endParaRPr lang="ko-KR" altLang="en-US" dirty="0"/>
           </a:p>
@@ -1308,7 +1308,7 @@
           <a:p>
             <a:fld id="{024994B9-23A6-4B0A-A038-AC140E83DAA3}" type="datetime1">
               <a:rPr lang="ko-KR" altLang="en-US" smtClean="0"/>
-              <a:t>2022-12-21</a:t>
+              <a:t>2022-12-28</a:t>
             </a:fld>
             <a:endParaRPr lang="ko-KR" altLang="en-US" dirty="0"/>
           </a:p>
@@ -1450,7 +1450,7 @@
           <a:p>
             <a:fld id="{B5B1BBC2-B738-4C35-AEE5-660EB2DEB482}" type="datetime1">
               <a:rPr lang="ko-KR" altLang="en-US" smtClean="0"/>
-              <a:t>2022-12-21</a:t>
+              <a:t>2022-12-28</a:t>
             </a:fld>
             <a:endParaRPr lang="ko-KR" altLang="en-US" dirty="0"/>
           </a:p>
@@ -6117,7 +6117,7 @@
           <a:p>
             <a:fld id="{70D0DAB2-87CB-4028-B965-3AA710ADF2CB}" type="datetime1">
               <a:rPr lang="ko-KR" altLang="en-US" smtClean="0"/>
-              <a:t>2022-12-21</a:t>
+              <a:t>2022-12-28</a:t>
             </a:fld>
             <a:endParaRPr lang="ko-KR" altLang="en-US" dirty="0"/>
           </a:p>
@@ -6392,7 +6392,7 @@
           <a:p>
             <a:fld id="{63FA3D71-FEA8-477F-9D1E-EA860F411BC7}" type="datetime1">
               <a:rPr lang="ko-KR" altLang="en-US" smtClean="0"/>
-              <a:t>2022-12-21</a:t>
+              <a:t>2022-12-28</a:t>
             </a:fld>
             <a:endParaRPr lang="ko-KR" altLang="en-US" dirty="0"/>
           </a:p>
@@ -6657,7 +6657,7 @@
           <a:p>
             <a:fld id="{F58E3EF4-7980-4C97-BA64-EC66995BB574}" type="datetime1">
               <a:rPr lang="ko-KR" altLang="en-US" smtClean="0"/>
-              <a:t>2022-12-21</a:t>
+              <a:t>2022-12-28</a:t>
             </a:fld>
             <a:endParaRPr lang="ko-KR" altLang="en-US" dirty="0"/>
           </a:p>
@@ -7069,7 +7069,7 @@
           <a:p>
             <a:fld id="{FC9BC1D0-7D6B-4634-9D19-644040D74EAE}" type="datetime1">
               <a:rPr lang="ko-KR" altLang="en-US" smtClean="0"/>
-              <a:t>2022-12-21</a:t>
+              <a:t>2022-12-28</a:t>
             </a:fld>
             <a:endParaRPr lang="ko-KR" altLang="en-US" dirty="0"/>
           </a:p>
@@ -7210,7 +7210,7 @@
           <a:p>
             <a:fld id="{B5B1BBC2-B738-4C35-AEE5-660EB2DEB482}" type="datetime1">
               <a:rPr lang="ko-KR" altLang="en-US" smtClean="0"/>
-              <a:t>2022-12-21</a:t>
+              <a:t>2022-12-28</a:t>
             </a:fld>
             <a:endParaRPr lang="ko-KR" altLang="en-US" dirty="0"/>
           </a:p>
@@ -11792,7 +11792,7 @@
           <a:p>
             <a:fld id="{C60E9F93-7E77-4F36-B88C-A425F00C8D91}" type="datetime1">
               <a:rPr lang="ko-KR" altLang="en-US" smtClean="0"/>
-              <a:t>2022-12-21</a:t>
+              <a:t>2022-12-28</a:t>
             </a:fld>
             <a:endParaRPr lang="ko-KR" altLang="en-US" dirty="0"/>
           </a:p>
@@ -12103,7 +12103,7 @@
           <a:p>
             <a:fld id="{36BCCD0E-2A54-4016-BFFC-FEAABCDA6915}" type="datetime1">
               <a:rPr lang="ko-KR" altLang="en-US" smtClean="0"/>
-              <a:t>2022-12-21</a:t>
+              <a:t>2022-12-28</a:t>
             </a:fld>
             <a:endParaRPr lang="ko-KR" altLang="en-US" dirty="0"/>
           </a:p>
@@ -12391,7 +12391,7 @@
           <a:p>
             <a:fld id="{C984B0C4-64BA-4E4C-B5E6-A51EE3F6ED95}" type="datetime1">
               <a:rPr lang="ko-KR" altLang="en-US" smtClean="0"/>
-              <a:t>2022-12-21</a:t>
+              <a:t>2022-12-28</a:t>
             </a:fld>
             <a:endParaRPr lang="ko-KR" altLang="en-US" dirty="0"/>
           </a:p>
@@ -12633,7 +12633,7 @@
           <a:p>
             <a:fld id="{C984B0C4-64BA-4E4C-B5E6-A51EE3F6ED95}" type="datetime1">
               <a:rPr lang="ko-KR" altLang="en-US" smtClean="0"/>
-              <a:t>2022-12-21</a:t>
+              <a:t>2022-12-28</a:t>
             </a:fld>
             <a:endParaRPr lang="ko-KR" altLang="en-US" dirty="0"/>
           </a:p>
@@ -15348,6 +15348,230 @@
           </a:p>
         </p:txBody>
       </p:sp>
+      <p:sp>
+        <p:nvSpPr>
+          <p:cNvPr id="3" name="사각형: 빗면 2">
+            <a:extLst>
+              <a:ext uri="{FF2B5EF4-FFF2-40B4-BE49-F238E27FC236}">
+                <a16:creationId xmlns:a16="http://schemas.microsoft.com/office/drawing/2014/main" id="{EA0B0213-28F7-C9A6-DE4A-8FF0E176A7E2}"/>
+              </a:ext>
+            </a:extLst>
+          </p:cNvPr>
+          <p:cNvSpPr/>
+          <p:nvPr/>
+        </p:nvSpPr>
+        <p:spPr>
+          <a:xfrm>
+            <a:off x="8109908" y="4356847"/>
+            <a:ext cx="2695552" cy="1858681"/>
+          </a:xfrm>
+          <a:prstGeom prst="bevel">
+            <a:avLst>
+              <a:gd name="adj" fmla="val 0"/>
+            </a:avLst>
+          </a:prstGeom>
+          <a:ln>
+            <a:solidFill>
+              <a:schemeClr val="tx1"/>
+            </a:solidFill>
+          </a:ln>
+        </p:spPr>
+        <p:style>
+          <a:lnRef idx="2">
+            <a:schemeClr val="accent1">
+              <a:shade val="50000"/>
+            </a:schemeClr>
+          </a:lnRef>
+          <a:fillRef idx="1">
+            <a:schemeClr val="accent1"/>
+          </a:fillRef>
+          <a:effectRef idx="0">
+            <a:schemeClr val="accent1"/>
+          </a:effectRef>
+          <a:fontRef idx="minor">
+            <a:schemeClr val="lt1"/>
+          </a:fontRef>
+        </p:style>
+        <p:txBody>
+          <a:bodyPr rtlCol="0" anchor="ctr"/>
+          <a:lstStyle/>
+          <a:p>
+            <a:pPr algn="ctr"/>
+            <a:r>
+              <a:rPr lang="en-US" altLang="ko-KR" dirty="0">
+                <a:solidFill>
+                  <a:schemeClr val="bg2"/>
+                </a:solidFill>
+              </a:rPr>
+              <a:t>M[manualLamp2]</a:t>
+            </a:r>
+          </a:p>
+          <a:p>
+            <a:pPr algn="ctr"/>
+            <a:r>
+              <a:rPr lang="en-US" altLang="ko-KR" dirty="0">
+                <a:solidFill>
+                  <a:schemeClr val="bg2"/>
+                </a:solidFill>
+              </a:rPr>
+              <a:t>E[emgLamp2]</a:t>
+            </a:r>
+          </a:p>
+          <a:p>
+            <a:pPr algn="ctr"/>
+            <a:r>
+              <a:rPr lang="en-US" altLang="ko-KR" dirty="0">
+                <a:solidFill>
+                  <a:schemeClr val="bg2"/>
+                </a:solidFill>
+              </a:rPr>
+              <a:t>D[dryrunLamp2]</a:t>
+            </a:r>
+          </a:p>
+        </p:txBody>
+      </p:sp>
+      <p:sp>
+        <p:nvSpPr>
+          <p:cNvPr id="10" name="사각형: 빗면 9">
+            <a:extLst>
+              <a:ext uri="{FF2B5EF4-FFF2-40B4-BE49-F238E27FC236}">
+                <a16:creationId xmlns:a16="http://schemas.microsoft.com/office/drawing/2014/main" id="{24B8EA58-FC9B-F3F1-C35D-0F76F046E22A}"/>
+              </a:ext>
+            </a:extLst>
+          </p:cNvPr>
+          <p:cNvSpPr/>
+          <p:nvPr/>
+        </p:nvSpPr>
+        <p:spPr>
+          <a:xfrm>
+            <a:off x="8253696" y="478176"/>
+            <a:ext cx="3591555" cy="3534697"/>
+          </a:xfrm>
+          <a:prstGeom prst="bevel">
+            <a:avLst>
+              <a:gd name="adj" fmla="val 16754"/>
+            </a:avLst>
+          </a:prstGeom>
+          <a:ln>
+            <a:solidFill>
+              <a:schemeClr val="tx1"/>
+            </a:solidFill>
+          </a:ln>
+        </p:spPr>
+        <p:style>
+          <a:lnRef idx="2">
+            <a:schemeClr val="accent1">
+              <a:shade val="50000"/>
+            </a:schemeClr>
+          </a:lnRef>
+          <a:fillRef idx="1">
+            <a:schemeClr val="accent1"/>
+          </a:fillRef>
+          <a:effectRef idx="0">
+            <a:schemeClr val="accent1"/>
+          </a:effectRef>
+          <a:fontRef idx="minor">
+            <a:schemeClr val="lt1"/>
+          </a:fontRef>
+        </p:style>
+        <p:txBody>
+          <a:bodyPr rtlCol="0" anchor="ctr"/>
+          <a:lstStyle/>
+          <a:p>
+            <a:pPr algn="ctr"/>
+            <a:r>
+              <a:rPr lang="en-US" altLang="ko-KR" dirty="0">
+                <a:solidFill>
+                  <a:schemeClr val="bg2"/>
+                </a:solidFill>
+              </a:rPr>
+              <a:t>A[autoBtn1]</a:t>
+            </a:r>
+          </a:p>
+          <a:p>
+            <a:pPr algn="ctr"/>
+            <a:r>
+              <a:rPr lang="en-US" altLang="ko-KR" dirty="0">
+                <a:solidFill>
+                  <a:schemeClr val="bg2"/>
+                </a:solidFill>
+              </a:rPr>
+              <a:t>M[manualBtn1]</a:t>
+            </a:r>
+          </a:p>
+          <a:p>
+            <a:pPr algn="ctr"/>
+            <a:r>
+              <a:rPr lang="en-US" altLang="ko-KR" dirty="0">
+                <a:solidFill>
+                  <a:schemeClr val="bg2"/>
+                </a:solidFill>
+              </a:rPr>
+              <a:t>E[emgBtn1]</a:t>
+            </a:r>
+          </a:p>
+          <a:p>
+            <a:pPr algn="ctr"/>
+            <a:r>
+              <a:rPr lang="en-US" altLang="ko-KR" dirty="0">
+                <a:solidFill>
+                  <a:schemeClr val="bg2"/>
+                </a:solidFill>
+              </a:rPr>
+              <a:t>S[stopBtn1]</a:t>
+            </a:r>
+          </a:p>
+          <a:p>
+            <a:pPr algn="ctr"/>
+            <a:r>
+              <a:rPr lang="en-US" altLang="ko-KR" dirty="0">
+                <a:solidFill>
+                  <a:schemeClr val="bg2"/>
+                </a:solidFill>
+              </a:rPr>
+              <a:t>C[clearBtn1]</a:t>
+            </a:r>
+          </a:p>
+          <a:p>
+            <a:pPr algn="ctr"/>
+            <a:r>
+              <a:rPr lang="en-US" altLang="ko-KR" dirty="0">
+                <a:solidFill>
+                  <a:schemeClr val="bg2"/>
+                </a:solidFill>
+              </a:rPr>
+              <a:t>R[runBtn1]</a:t>
+            </a:r>
+          </a:p>
+          <a:p>
+            <a:pPr algn="ctr"/>
+            <a:r>
+              <a:rPr lang="en-US" altLang="ko-KR" dirty="0">
+                <a:solidFill>
+                  <a:schemeClr val="bg2"/>
+                </a:solidFill>
+              </a:rPr>
+              <a:t>D[dryrunBtn1]</a:t>
+            </a:r>
+          </a:p>
+          <a:p>
+            <a:pPr algn="ctr"/>
+            <a:r>
+              <a:rPr lang="en-US" altLang="ko-KR" dirty="0">
+                <a:solidFill>
+                  <a:schemeClr val="bg2"/>
+                </a:solidFill>
+              </a:rPr>
+              <a:t>H[homeBtn1]</a:t>
+            </a:r>
+            <a:endParaRPr lang="en-US" altLang="ko-KR" sz="1400" dirty="0">
+              <a:solidFill>
+                <a:schemeClr val="bg2"/>
+              </a:solidFill>
+            </a:endParaRPr>
+          </a:p>
+        </p:txBody>
+      </p:sp>
     </p:spTree>
     <p:extLst>
       <p:ext uri="{BB962C8B-B14F-4D97-AF65-F5344CB8AC3E}">
@@ -15409,10 +15633,10 @@
       </p:sp>
       <p:sp>
         <p:nvSpPr>
-          <p:cNvPr id="3" name="&quot;허용 안 됨&quot; 기호 2">
-            <a:extLst>
-              <a:ext uri="{FF2B5EF4-FFF2-40B4-BE49-F238E27FC236}">
-                <a16:creationId xmlns:a16="http://schemas.microsoft.com/office/drawing/2014/main" id="{71150BE1-6B5C-1750-73A3-25D64C876AFF}"/>
+          <p:cNvPr id="4" name="사각형: 빗면 3">
+            <a:extLst>
+              <a:ext uri="{FF2B5EF4-FFF2-40B4-BE49-F238E27FC236}">
+                <a16:creationId xmlns:a16="http://schemas.microsoft.com/office/drawing/2014/main" id="{46DE3FC5-F63B-4762-025F-E4864E3BE855}"/>
               </a:ext>
             </a:extLst>
           </p:cNvPr>
@@ -15421,11 +15645,13 @@
         </p:nvSpPr>
         <p:spPr>
           <a:xfrm>
-            <a:off x="7020174" y="475269"/>
-            <a:ext cx="1772204" cy="1690778"/>
+            <a:off x="1658871" y="2561303"/>
+            <a:ext cx="3591555" cy="3534697"/>
           </a:xfrm>
-          <a:prstGeom prst="noSmoking">
-            <a:avLst/>
+          <a:prstGeom prst="bevel">
+            <a:avLst>
+              <a:gd name="adj" fmla="val 16754"/>
+            </a:avLst>
           </a:prstGeom>
           <a:ln>
             <a:solidFill>
@@ -15457,14 +15683,91 @@
             <a:r>
               <a:rPr lang="en-US" altLang="ko-KR" dirty="0">
                 <a:solidFill>
-                  <a:schemeClr val="tx1"/>
+                  <a:schemeClr val="bg2"/>
                 </a:solidFill>
               </a:rPr>
-              <a:t>EMG1</a:t>
-            </a:r>
-            <a:endParaRPr lang="ko-KR" altLang="en-US" dirty="0">
+              <a:t>A[autoBtn1]</a:t>
+            </a:r>
+          </a:p>
+          <a:p>
+            <a:pPr algn="ctr"/>
+            <a:r>
+              <a:rPr lang="en-US" altLang="ko-KR" dirty="0">
+                <a:solidFill>
+                  <a:schemeClr val="bg2"/>
+                </a:solidFill>
+              </a:rPr>
+              <a:t>M[manualBtn1]</a:t>
+            </a:r>
+          </a:p>
+          <a:p>
+            <a:pPr algn="ctr"/>
+            <a:r>
+              <a:rPr lang="en-US" altLang="ko-KR" dirty="0">
+                <a:solidFill>
+                  <a:schemeClr val="bg2"/>
+                </a:solidFill>
+              </a:rPr>
+              <a:t>E[emgBtn1]</a:t>
+            </a:r>
+          </a:p>
+          <a:p>
+            <a:pPr algn="ctr"/>
+            <a:r>
+              <a:rPr lang="en-US" altLang="ko-KR" dirty="0">
+                <a:solidFill>
+                  <a:schemeClr val="bg2"/>
+                </a:solidFill>
+              </a:rPr>
+              <a:t>S[stopBtn1]</a:t>
+            </a:r>
+          </a:p>
+          <a:p>
+            <a:pPr algn="ctr"/>
+            <a:r>
+              <a:rPr lang="en-US" altLang="ko-KR" dirty="0">
+                <a:solidFill>
+                  <a:schemeClr val="bg2"/>
+                </a:solidFill>
+              </a:rPr>
+              <a:t>C[clearBtn1]</a:t>
+            </a:r>
+          </a:p>
+          <a:p>
+            <a:pPr algn="ctr"/>
+            <a:r>
+              <a:rPr lang="en-US" altLang="ko-KR" dirty="0">
+                <a:solidFill>
+                  <a:schemeClr val="bg2"/>
+                </a:solidFill>
+              </a:rPr>
+              <a:t>R[runBtn1]</a:t>
+            </a:r>
+          </a:p>
+          <a:p>
+            <a:pPr algn="ctr"/>
+            <a:r>
+              <a:rPr lang="en-US" altLang="ko-KR" dirty="0">
+                <a:solidFill>
+                  <a:schemeClr val="bg2"/>
+                </a:solidFill>
+              </a:rPr>
+              <a:t>D[dryrunBtn1]</a:t>
+            </a:r>
+          </a:p>
+          <a:p>
+            <a:pPr algn="ctr"/>
+            <a:r>
+              <a:rPr lang="en-US" altLang="ko-KR" dirty="0">
+                <a:solidFill>
+                  <a:schemeClr val="bg2"/>
+                </a:solidFill>
+              </a:rPr>
+              <a:t>H[homeBtn1]</a:t>
+            </a:r>
+            <a:endParaRPr lang="en-US" altLang="ko-KR" sz="1400" dirty="0">
               <a:solidFill>
-                <a:schemeClr val="tx1"/>
+                <a:schemeClr val="bg2"/>
               </a:solidFill>
             </a:endParaRPr>
           </a:p>
@@ -15472,10 +15775,10 @@
       </p:sp>
       <p:sp>
         <p:nvSpPr>
-          <p:cNvPr id="10" name="사각형: 빗면 9">
-            <a:extLst>
-              <a:ext uri="{FF2B5EF4-FFF2-40B4-BE49-F238E27FC236}">
-                <a16:creationId xmlns:a16="http://schemas.microsoft.com/office/drawing/2014/main" id="{8A720798-24E9-449D-3026-B2F852A7056C}"/>
+          <p:cNvPr id="5" name="사각형: 빗면 4">
+            <a:extLst>
+              <a:ext uri="{FF2B5EF4-FFF2-40B4-BE49-F238E27FC236}">
+                <a16:creationId xmlns:a16="http://schemas.microsoft.com/office/drawing/2014/main" id="{DB236E01-5964-6AEB-7B99-CC2A9EE7249D}"/>
               </a:ext>
             </a:extLst>
           </p:cNvPr>
@@ -15484,11 +15787,13 @@
         </p:nvSpPr>
         <p:spPr>
           <a:xfrm>
-            <a:off x="7598020" y="2536077"/>
-            <a:ext cx="1104181" cy="1245933"/>
+            <a:off x="6427516" y="2561302"/>
+            <a:ext cx="3591555" cy="3534697"/>
           </a:xfrm>
           <a:prstGeom prst="bevel">
-            <a:avLst/>
+            <a:avLst>
+              <a:gd name="adj" fmla="val 0"/>
+            </a:avLst>
           </a:prstGeom>
           <a:ln>
             <a:solidFill>
@@ -15518,131 +15823,57 @@
           <a:p>
             <a:pPr algn="ctr"/>
             <a:r>
-              <a:rPr lang="en-US" altLang="ko-KR" dirty="0"/>
-              <a:t>RESET1</a:t>
-            </a:r>
-            <a:endParaRPr lang="ko-KR" altLang="en-US" dirty="0"/>
-          </a:p>
-        </p:txBody>
-      </p:sp>
-      <p:sp>
-        <p:nvSpPr>
-          <p:cNvPr id="11" name="원형: 비어 있음 10">
-            <a:extLst>
-              <a:ext uri="{FF2B5EF4-FFF2-40B4-BE49-F238E27FC236}">
-                <a16:creationId xmlns:a16="http://schemas.microsoft.com/office/drawing/2014/main" id="{71F39176-5B54-BDCA-08DD-D38B0EA1599E}"/>
-              </a:ext>
-            </a:extLst>
-          </p:cNvPr>
-          <p:cNvSpPr/>
-          <p:nvPr/>
-        </p:nvSpPr>
-        <p:spPr>
-          <a:xfrm>
-            <a:off x="5267927" y="475269"/>
-            <a:ext cx="1673524" cy="1690778"/>
-          </a:xfrm>
-          <a:prstGeom prst="donut">
-            <a:avLst/>
-          </a:prstGeom>
-          <a:ln>
-            <a:solidFill>
-              <a:schemeClr val="tx1"/>
-            </a:solidFill>
-          </a:ln>
-        </p:spPr>
-        <p:style>
-          <a:lnRef idx="2">
-            <a:schemeClr val="accent1">
-              <a:shade val="50000"/>
-            </a:schemeClr>
-          </a:lnRef>
-          <a:fillRef idx="1">
-            <a:schemeClr val="accent1"/>
-          </a:fillRef>
-          <a:effectRef idx="0">
-            <a:schemeClr val="accent1"/>
-          </a:effectRef>
-          <a:fontRef idx="minor">
-            <a:schemeClr val="lt1"/>
-          </a:fontRef>
-        </p:style>
-        <p:txBody>
-          <a:bodyPr rtlCol="0" anchor="ctr"/>
-          <a:lstStyle/>
+              <a:rPr lang="en-US" altLang="ko-KR" dirty="0">
+                <a:solidFill>
+                  <a:schemeClr val="bg2"/>
+                </a:solidFill>
+              </a:rPr>
+              <a:t>R[runLamp1]</a:t>
+            </a:r>
+          </a:p>
           <a:p>
             <a:pPr algn="ctr"/>
             <a:r>
               <a:rPr lang="en-US" altLang="ko-KR" dirty="0">
                 <a:solidFill>
-                  <a:schemeClr val="tx1"/>
+                  <a:schemeClr val="bg2"/>
                 </a:solidFill>
               </a:rPr>
-              <a:t>Start1</a:t>
-            </a:r>
-            <a:endParaRPr lang="ko-KR" altLang="en-US" dirty="0">
-              <a:solidFill>
-                <a:schemeClr val="tx1"/>
-              </a:solidFill>
-            </a:endParaRPr>
-          </a:p>
-        </p:txBody>
-      </p:sp>
-      <p:sp>
-        <p:nvSpPr>
-          <p:cNvPr id="7" name="막힌 원호 6">
-            <a:extLst>
-              <a:ext uri="{FF2B5EF4-FFF2-40B4-BE49-F238E27FC236}">
-                <a16:creationId xmlns:a16="http://schemas.microsoft.com/office/drawing/2014/main" id="{EBA8504C-5A73-239C-D23F-12E7A9347EB4}"/>
-              </a:ext>
-            </a:extLst>
-          </p:cNvPr>
-          <p:cNvSpPr/>
-          <p:nvPr/>
-        </p:nvSpPr>
-        <p:spPr>
-          <a:xfrm>
-            <a:off x="5339752" y="2698614"/>
-            <a:ext cx="1949570" cy="2114925"/>
-          </a:xfrm>
-          <a:prstGeom prst="blockArc">
-            <a:avLst/>
-          </a:prstGeom>
-        </p:spPr>
-        <p:style>
-          <a:lnRef idx="2">
-            <a:schemeClr val="accent1">
-              <a:shade val="50000"/>
-            </a:schemeClr>
-          </a:lnRef>
-          <a:fillRef idx="1">
-            <a:schemeClr val="accent1"/>
-          </a:fillRef>
-          <a:effectRef idx="0">
-            <a:schemeClr val="accent1"/>
-          </a:effectRef>
-          <a:fontRef idx="minor">
-            <a:schemeClr val="lt1"/>
-          </a:fontRef>
-        </p:style>
-        <p:txBody>
-          <a:bodyPr rtlCol="0" anchor="ctr"/>
-          <a:lstStyle/>
+              <a:t>S[stopLamp1]</a:t>
+            </a:r>
+          </a:p>
           <a:p>
             <a:pPr algn="ctr"/>
             <a:r>
-              <a:rPr lang="en-US" altLang="ko-KR">
-                <a:solidFill>
-                  <a:schemeClr val="tx1"/>
+              <a:rPr lang="en-US" altLang="ko-KR" dirty="0">
+                <a:solidFill>
+                  <a:schemeClr val="bg2"/>
                 </a:solidFill>
               </a:rPr>
-              <a:t>AUTO1</a:t>
-            </a:r>
-            <a:endParaRPr lang="ko-KR" altLang="en-US">
-              <a:solidFill>
-                <a:schemeClr val="tx1"/>
-              </a:solidFill>
-            </a:endParaRPr>
+              <a:t>M[manualLamp1]</a:t>
+            </a:r>
+          </a:p>
+          <a:p>
+            <a:pPr algn="ctr"/>
+            <a:r>
+              <a:rPr lang="en-US" altLang="ko-KR" dirty="0">
+                <a:solidFill>
+                  <a:schemeClr val="bg2"/>
+                </a:solidFill>
+              </a:rPr>
+              <a:t>E[emgLamp1]</a:t>
+            </a:r>
+          </a:p>
+          <a:p>
+            <a:pPr algn="ctr"/>
+            <a:r>
+              <a:rPr lang="en-US" altLang="ko-KR" dirty="0">
+                <a:solidFill>
+                  <a:schemeClr val="bg2"/>
+                </a:solidFill>
+              </a:rPr>
+              <a:t>D[dryrunLamp1]</a:t>
+            </a:r>
           </a:p>
         </p:txBody>
       </p:sp>

</xml_diff>

<commit_message>
System Condtions 추가 (ReadyState/DriveState)
</commit_message>
<xml_diff>
--- a/DsDotNet/src/UnitTest/UnitTest.Engine/ImportOffice/Sample/s.pptx
+++ b/DsDotNet/src/UnitTest/UnitTest.Engine/ImportOffice/Sample/s.pptx
@@ -229,7 +229,7 @@
           <a:p>
             <a:fld id="{DD503887-5801-43A0-AEF9-041E8DDC2558}" type="datetimeFigureOut">
               <a:rPr lang="ko-KR" altLang="en-US" smtClean="0"/>
-              <a:t>2023-01-17</a:t>
+              <a:t>2023-01-18</a:t>
             </a:fld>
             <a:endParaRPr lang="ko-KR" altLang="en-US" dirty="0"/>
           </a:p>
@@ -406,7 +406,7 @@
           <a:p>
             <a:fld id="{95336A0E-57B1-4D4C-BD9B-2F72B5943464}" type="datetimeFigureOut">
               <a:rPr lang="ko-KR" altLang="en-US" smtClean="0"/>
-              <a:t>2023-01-17</a:t>
+              <a:t>2023-01-18</a:t>
             </a:fld>
             <a:endParaRPr lang="ko-KR" altLang="en-US" dirty="0"/>
           </a:p>
@@ -904,7 +904,7 @@
           <a:p>
             <a:fld id="{229D12C7-0FF5-4972-A033-474EFFC79F40}" type="datetime1">
               <a:rPr lang="ko-KR" altLang="en-US" smtClean="0"/>
-              <a:t>2023-01-17</a:t>
+              <a:t>2023-01-18</a:t>
             </a:fld>
             <a:endParaRPr lang="ko-KR" altLang="en-US" dirty="0"/>
           </a:p>
@@ -1102,7 +1102,7 @@
           <a:p>
             <a:fld id="{5BA19FD4-B052-4F56-8FD8-EAFD078DEFB0}" type="datetime1">
               <a:rPr lang="ko-KR" altLang="en-US" smtClean="0"/>
-              <a:t>2023-01-17</a:t>
+              <a:t>2023-01-18</a:t>
             </a:fld>
             <a:endParaRPr lang="ko-KR" altLang="en-US" dirty="0"/>
           </a:p>
@@ -1310,7 +1310,7 @@
           <a:p>
             <a:fld id="{024994B9-23A6-4B0A-A038-AC140E83DAA3}" type="datetime1">
               <a:rPr lang="ko-KR" altLang="en-US" smtClean="0"/>
-              <a:t>2023-01-17</a:t>
+              <a:t>2023-01-18</a:t>
             </a:fld>
             <a:endParaRPr lang="ko-KR" altLang="en-US" dirty="0"/>
           </a:p>
@@ -1452,7 +1452,7 @@
           <a:p>
             <a:fld id="{B5B1BBC2-B738-4C35-AEE5-660EB2DEB482}" type="datetime1">
               <a:rPr lang="ko-KR" altLang="en-US" smtClean="0"/>
-              <a:t>2023-01-17</a:t>
+              <a:t>2023-01-18</a:t>
             </a:fld>
             <a:endParaRPr lang="ko-KR" altLang="en-US" dirty="0"/>
           </a:p>
@@ -6119,7 +6119,7 @@
           <a:p>
             <a:fld id="{70D0DAB2-87CB-4028-B965-3AA710ADF2CB}" type="datetime1">
               <a:rPr lang="ko-KR" altLang="en-US" smtClean="0"/>
-              <a:t>2023-01-17</a:t>
+              <a:t>2023-01-18</a:t>
             </a:fld>
             <a:endParaRPr lang="ko-KR" altLang="en-US" dirty="0"/>
           </a:p>
@@ -6394,7 +6394,7 @@
           <a:p>
             <a:fld id="{63FA3D71-FEA8-477F-9D1E-EA860F411BC7}" type="datetime1">
               <a:rPr lang="ko-KR" altLang="en-US" smtClean="0"/>
-              <a:t>2023-01-17</a:t>
+              <a:t>2023-01-18</a:t>
             </a:fld>
             <a:endParaRPr lang="ko-KR" altLang="en-US" dirty="0"/>
           </a:p>
@@ -6659,7 +6659,7 @@
           <a:p>
             <a:fld id="{F58E3EF4-7980-4C97-BA64-EC66995BB574}" type="datetime1">
               <a:rPr lang="ko-KR" altLang="en-US" smtClean="0"/>
-              <a:t>2023-01-17</a:t>
+              <a:t>2023-01-18</a:t>
             </a:fld>
             <a:endParaRPr lang="ko-KR" altLang="en-US" dirty="0"/>
           </a:p>
@@ -7071,7 +7071,7 @@
           <a:p>
             <a:fld id="{FC9BC1D0-7D6B-4634-9D19-644040D74EAE}" type="datetime1">
               <a:rPr lang="ko-KR" altLang="en-US" smtClean="0"/>
-              <a:t>2023-01-17</a:t>
+              <a:t>2023-01-18</a:t>
             </a:fld>
             <a:endParaRPr lang="ko-KR" altLang="en-US" dirty="0"/>
           </a:p>
@@ -7212,7 +7212,7 @@
           <a:p>
             <a:fld id="{B5B1BBC2-B738-4C35-AEE5-660EB2DEB482}" type="datetime1">
               <a:rPr lang="ko-KR" altLang="en-US" smtClean="0"/>
-              <a:t>2023-01-17</a:t>
+              <a:t>2023-01-18</a:t>
             </a:fld>
             <a:endParaRPr lang="ko-KR" altLang="en-US" dirty="0"/>
           </a:p>
@@ -11794,7 +11794,7 @@
           <a:p>
             <a:fld id="{C60E9F93-7E77-4F36-B88C-A425F00C8D91}" type="datetime1">
               <a:rPr lang="ko-KR" altLang="en-US" smtClean="0"/>
-              <a:t>2023-01-17</a:t>
+              <a:t>2023-01-18</a:t>
             </a:fld>
             <a:endParaRPr lang="ko-KR" altLang="en-US" dirty="0"/>
           </a:p>
@@ -12105,7 +12105,7 @@
           <a:p>
             <a:fld id="{36BCCD0E-2A54-4016-BFFC-FEAABCDA6915}" type="datetime1">
               <a:rPr lang="ko-KR" altLang="en-US" smtClean="0"/>
-              <a:t>2023-01-17</a:t>
+              <a:t>2023-01-18</a:t>
             </a:fld>
             <a:endParaRPr lang="ko-KR" altLang="en-US" dirty="0"/>
           </a:p>
@@ -12393,7 +12393,7 @@
           <a:p>
             <a:fld id="{C984B0C4-64BA-4E4C-B5E6-A51EE3F6ED95}" type="datetime1">
               <a:rPr lang="ko-KR" altLang="en-US" smtClean="0"/>
-              <a:t>2023-01-17</a:t>
+              <a:t>2023-01-18</a:t>
             </a:fld>
             <a:endParaRPr lang="ko-KR" altLang="en-US" dirty="0"/>
           </a:p>
@@ -12635,7 +12635,7 @@
           <a:p>
             <a:fld id="{C984B0C4-64BA-4E4C-B5E6-A51EE3F6ED95}" type="datetime1">
               <a:rPr lang="ko-KR" altLang="en-US" smtClean="0"/>
-              <a:t>2023-01-17</a:t>
+              <a:t>2023-01-18</a:t>
             </a:fld>
             <a:endParaRPr lang="ko-KR" altLang="en-US" dirty="0"/>
           </a:p>
@@ -13185,7 +13185,7 @@
         </p:nvSpPr>
         <p:spPr>
           <a:xfrm>
-            <a:off x="7988400" y="4158041"/>
+            <a:off x="7349499" y="4624766"/>
             <a:ext cx="2437946" cy="1223682"/>
           </a:xfrm>
           <a:prstGeom prst="rect">
@@ -13246,7 +13246,7 @@
         <p:spPr>
           <a:xfrm>
             <a:off x="6534526" y="4220068"/>
-            <a:ext cx="1453874" cy="549814"/>
+            <a:ext cx="814973" cy="1016539"/>
           </a:xfrm>
           <a:prstGeom prst="straightConnector1">
             <a:avLst/>
@@ -13550,7 +13550,7 @@
         </p:nvSpPr>
         <p:spPr>
           <a:xfrm>
-            <a:off x="9316310" y="2557743"/>
+            <a:off x="8545957" y="2675440"/>
             <a:ext cx="2437946" cy="1223682"/>
           </a:xfrm>
           <a:prstGeom prst="foldedCorner">
@@ -15833,7 +15833,7 @@
 </file>
 
 <file path=ppt/slides/slide14.xml><?xml version="1.0" encoding="utf-8"?>
-<p:sld xmlns:a="http://schemas.openxmlformats.org/drawingml/2006/main" xmlns:r="http://schemas.openxmlformats.org/officeDocument/2006/relationships" xmlns:p="http://schemas.openxmlformats.org/presentationml/2006/main" show="0">
+<p:sld xmlns:a="http://schemas.openxmlformats.org/drawingml/2006/main" xmlns:r="http://schemas.openxmlformats.org/officeDocument/2006/relationships" xmlns:p="http://schemas.openxmlformats.org/presentationml/2006/main">
   <p:cSld>
     <p:spTree>
       <p:nvGrpSpPr>
@@ -16488,12 +16488,12 @@
         </p:nvSpPr>
         <p:spPr>
           <a:xfrm>
-            <a:off x="6918967" y="122903"/>
+            <a:off x="4799148" y="103853"/>
             <a:ext cx="3591555" cy="3534697"/>
           </a:xfrm>
           <a:prstGeom prst="bevel">
             <a:avLst>
-              <a:gd name="adj" fmla="val 16754"/>
+              <a:gd name="adj" fmla="val 11343"/>
             </a:avLst>
           </a:prstGeom>
           <a:ln>
@@ -16641,7 +16641,7 @@
         </p:nvSpPr>
         <p:spPr>
           <a:xfrm>
-            <a:off x="7766281" y="2815763"/>
+            <a:off x="7574864" y="1848422"/>
             <a:ext cx="3591555" cy="3534697"/>
           </a:xfrm>
           <a:prstGeom prst="bevel">
@@ -16756,6 +16756,115 @@
             <a:endParaRPr lang="en-US" altLang="ko-KR" dirty="0">
               <a:solidFill>
                 <a:schemeClr val="bg2"/>
+              </a:solidFill>
+            </a:endParaRPr>
+          </a:p>
+        </p:txBody>
+      </p:sp>
+      <p:sp>
+        <p:nvSpPr>
+          <p:cNvPr id="16" name="액자 15">
+            <a:extLst>
+              <a:ext uri="{FF2B5EF4-FFF2-40B4-BE49-F238E27FC236}">
+                <a16:creationId xmlns:a16="http://schemas.microsoft.com/office/drawing/2014/main" id="{1610772C-96DB-6162-AD6C-5B8E4E49574B}"/>
+              </a:ext>
+            </a:extLst>
+          </p:cNvPr>
+          <p:cNvSpPr/>
+          <p:nvPr/>
+        </p:nvSpPr>
+        <p:spPr>
+          <a:xfrm>
+            <a:off x="2152650" y="726379"/>
+            <a:ext cx="1595718" cy="1760724"/>
+          </a:xfrm>
+          <a:prstGeom prst="frame">
+            <a:avLst>
+              <a:gd name="adj1" fmla="val 9738"/>
+            </a:avLst>
+          </a:prstGeom>
+        </p:spPr>
+        <p:style>
+          <a:lnRef idx="2">
+            <a:schemeClr val="accent1">
+              <a:shade val="50000"/>
+            </a:schemeClr>
+          </a:lnRef>
+          <a:fillRef idx="1">
+            <a:schemeClr val="accent1"/>
+          </a:fillRef>
+          <a:effectRef idx="0">
+            <a:schemeClr val="accent1"/>
+          </a:effectRef>
+          <a:fontRef idx="minor">
+            <a:schemeClr val="lt1"/>
+          </a:fontRef>
+        </p:style>
+        <p:txBody>
+          <a:bodyPr rtlCol="0" anchor="ctr"/>
+          <a:lstStyle/>
+          <a:p>
+            <a:pPr algn="ctr"/>
+            <a:r>
+              <a:rPr lang="en-US" altLang="ko-KR" sz="1100">
+                <a:solidFill>
+                  <a:schemeClr val="tx1"/>
+                </a:solidFill>
+              </a:rPr>
+              <a:t>R[airOn1]</a:t>
+            </a:r>
+          </a:p>
+          <a:p>
+            <a:pPr algn="ctr"/>
+            <a:r>
+              <a:rPr lang="en-US" altLang="ko-KR" sz="1100">
+                <a:solidFill>
+                  <a:schemeClr val="tx1"/>
+                </a:solidFill>
+              </a:rPr>
+              <a:t>R[airOn2]</a:t>
+            </a:r>
+          </a:p>
+          <a:p>
+            <a:pPr algn="ctr"/>
+            <a:endParaRPr lang="en-US" altLang="ko-KR" sz="1100">
+              <a:solidFill>
+                <a:schemeClr val="tx1"/>
+              </a:solidFill>
+            </a:endParaRPr>
+          </a:p>
+          <a:p>
+            <a:pPr algn="ctr"/>
+            <a:r>
+              <a:rPr lang="en-US" altLang="ko-KR" sz="1100">
+                <a:solidFill>
+                  <a:schemeClr val="tx1"/>
+                </a:solidFill>
+              </a:rPr>
+              <a:t>D[leakOn]</a:t>
+            </a:r>
+          </a:p>
+          <a:p>
+            <a:pPr algn="ctr"/>
+            <a:r>
+              <a:rPr lang="en-US" altLang="ko-KR" sz="1100">
+                <a:solidFill>
+                  <a:schemeClr val="tx1"/>
+                </a:solidFill>
+              </a:rPr>
+              <a:t>D[waterLowErr]</a:t>
+            </a:r>
+            <a:endParaRPr lang="ko-KR" altLang="en-US" sz="1100">
+              <a:solidFill>
+                <a:schemeClr val="tx1"/>
+              </a:solidFill>
+            </a:endParaRPr>
+          </a:p>
+          <a:p>
+            <a:pPr algn="ctr"/>
+            <a:endParaRPr lang="ko-KR" altLang="en-US" sz="1100" dirty="0">
+              <a:solidFill>
+                <a:schemeClr val="tx1"/>
               </a:solidFill>
             </a:endParaRPr>
           </a:p>

</xml_diff>

<commit_message>
4.OperationMode xgi 내리기 xml
</commit_message>
<xml_diff>
--- a/DsDotNet/src/UnitTest/UnitTest.Engine/ImportOffice/Sample/s.pptx
+++ b/DsDotNet/src/UnitTest/UnitTest.Engine/ImportOffice/Sample/s.pptx
@@ -16516,7 +16516,7 @@
         <p:spPr>
           <a:xfrm>
             <a:off x="7079227" y="2045109"/>
-            <a:ext cx="1600118" cy="369332"/>
+            <a:ext cx="1856598" cy="369332"/>
           </a:xfrm>
           <a:prstGeom prst="rect">
             <a:avLst/>
@@ -16535,7 +16535,7 @@
                   <a:schemeClr val="accent1"/>
                 </a:solidFill>
               </a:rPr>
-              <a:t>A M D S E T R</a:t>
+              <a:t>A M D S E T R I</a:t>
             </a:r>
             <a:endParaRPr lang="ko-KR" altLang="en-US" dirty="0">
               <a:solidFill>

</xml_diff>

<commit_message>
Revert "4.OperationMode xgi 내리기 xml"
This reverts commit cfab761ee0e895a97912eefcbc86c6751c9189dc.
</commit_message>
<xml_diff>
--- a/DsDotNet/src/UnitTest/UnitTest.Engine/ImportOffice/Sample/s.pptx
+++ b/DsDotNet/src/UnitTest/UnitTest.Engine/ImportOffice/Sample/s.pptx
@@ -16516,7 +16516,7 @@
         <p:spPr>
           <a:xfrm>
             <a:off x="7079227" y="2045109"/>
-            <a:ext cx="1856598" cy="369332"/>
+            <a:ext cx="1600118" cy="369332"/>
           </a:xfrm>
           <a:prstGeom prst="rect">
             <a:avLst/>
@@ -16535,7 +16535,7 @@
                   <a:schemeClr val="accent1"/>
                 </a:solidFill>
               </a:rPr>
-              <a:t>A M D S E T R I</a:t>
+              <a:t>A M D S E T R</a:t>
             </a:r>
             <a:endParaRPr lang="ko-KR" altLang="en-US" dirty="0">
               <a:solidFill>

</xml_diff>

<commit_message>
Revert "Revert "4.OperationMode xgi 내리기 xml""
This reverts commit 21e80640acf1f43dd66de11ff68b073467dba9a9.
</commit_message>
<xml_diff>
--- a/DsDotNet/src/UnitTest/UnitTest.Engine/ImportOffice/Sample/s.pptx
+++ b/DsDotNet/src/UnitTest/UnitTest.Engine/ImportOffice/Sample/s.pptx
@@ -16516,7 +16516,7 @@
         <p:spPr>
           <a:xfrm>
             <a:off x="7079227" y="2045109"/>
-            <a:ext cx="1600118" cy="369332"/>
+            <a:ext cx="1856598" cy="369332"/>
           </a:xfrm>
           <a:prstGeom prst="rect">
             <a:avLst/>
@@ -16535,7 +16535,7 @@
                   <a:schemeClr val="accent1"/>
                 </a:solidFill>
               </a:rPr>
-              <a:t>A M D S E T R</a:t>
+              <a:t>A M D S E T R I</a:t>
             </a:r>
             <a:endParaRPr lang="ko-KR" altLang="en-US" dirty="0">
               <a:solidFill>

</xml_diff>

<commit_message>
system tag name _XXX -> sysXXX  로 변경
</commit_message>
<xml_diff>
--- a/DsDotNet/src/UnitTest/UnitTest.Engine/ImportOffice/Sample/s.pptx
+++ b/DsDotNet/src/UnitTest/UnitTest.Engine/ImportOffice/Sample/s.pptx
@@ -13041,7 +13041,7 @@
 </file>
 
 <file path=ppt/slides/slide1.xml><?xml version="1.0" encoding="utf-8"?>
-<p:sld xmlns:a="http://schemas.openxmlformats.org/drawingml/2006/main" xmlns:r="http://schemas.openxmlformats.org/officeDocument/2006/relationships" xmlns:p="http://schemas.openxmlformats.org/presentationml/2006/main">
+<p:sld xmlns:a="http://schemas.openxmlformats.org/drawingml/2006/main" xmlns:r="http://schemas.openxmlformats.org/officeDocument/2006/relationships" xmlns:p="http://schemas.openxmlformats.org/presentationml/2006/main" show="0">
   <p:cSld>
     <p:spTree>
       <p:nvGrpSpPr>
@@ -13129,7 +13129,7 @@
 </file>
 
 <file path=ppt/slides/slide10.xml><?xml version="1.0" encoding="utf-8"?>
-<p:sld xmlns:a="http://schemas.openxmlformats.org/drawingml/2006/main" xmlns:r="http://schemas.openxmlformats.org/officeDocument/2006/relationships" xmlns:p="http://schemas.openxmlformats.org/presentationml/2006/main">
+<p:sld xmlns:a="http://schemas.openxmlformats.org/drawingml/2006/main" xmlns:r="http://schemas.openxmlformats.org/officeDocument/2006/relationships" xmlns:p="http://schemas.openxmlformats.org/presentationml/2006/main" show="0">
   <p:cSld>
     <p:spTree>
       <p:nvGrpSpPr>
@@ -13674,7 +13674,7 @@
 </file>
 
 <file path=ppt/slides/slide11.xml><?xml version="1.0" encoding="utf-8"?>
-<p:sld xmlns:a="http://schemas.openxmlformats.org/drawingml/2006/main" xmlns:r="http://schemas.openxmlformats.org/officeDocument/2006/relationships" xmlns:p="http://schemas.openxmlformats.org/presentationml/2006/main">
+<p:sld xmlns:a="http://schemas.openxmlformats.org/drawingml/2006/main" xmlns:r="http://schemas.openxmlformats.org/officeDocument/2006/relationships" xmlns:p="http://schemas.openxmlformats.org/presentationml/2006/main" show="0">
   <p:cSld>
     <p:spTree>
       <p:nvGrpSpPr>
@@ -14253,7 +14253,7 @@
 </file>
 
 <file path=ppt/slides/slide12.xml><?xml version="1.0" encoding="utf-8"?>
-<p:sld xmlns:a="http://schemas.openxmlformats.org/drawingml/2006/main" xmlns:r="http://schemas.openxmlformats.org/officeDocument/2006/relationships" xmlns:p="http://schemas.openxmlformats.org/presentationml/2006/main">
+<p:sld xmlns:a="http://schemas.openxmlformats.org/drawingml/2006/main" xmlns:r="http://schemas.openxmlformats.org/officeDocument/2006/relationships" xmlns:p="http://schemas.openxmlformats.org/presentationml/2006/main" show="0">
   <p:cSld>
     <p:spTree>
       <p:nvGrpSpPr>
@@ -14789,7 +14789,7 @@
 </file>
 
 <file path=ppt/slides/slide13.xml><?xml version="1.0" encoding="utf-8"?>
-<p:sld xmlns:a="http://schemas.openxmlformats.org/drawingml/2006/main" xmlns:r="http://schemas.openxmlformats.org/officeDocument/2006/relationships" xmlns:p="http://schemas.openxmlformats.org/presentationml/2006/main">
+<p:sld xmlns:a="http://schemas.openxmlformats.org/drawingml/2006/main" xmlns:r="http://schemas.openxmlformats.org/officeDocument/2006/relationships" xmlns:p="http://schemas.openxmlformats.org/presentationml/2006/main" show="0">
   <p:cSld>
     <p:spTree>
       <p:nvGrpSpPr>
@@ -15836,7 +15836,7 @@
 </file>
 
 <file path=ppt/slides/slide14.xml><?xml version="1.0" encoding="utf-8"?>
-<p:sld xmlns:a="http://schemas.openxmlformats.org/drawingml/2006/main" xmlns:r="http://schemas.openxmlformats.org/officeDocument/2006/relationships" xmlns:p="http://schemas.openxmlformats.org/presentationml/2006/main">
+<p:sld xmlns:a="http://schemas.openxmlformats.org/drawingml/2006/main" xmlns:r="http://schemas.openxmlformats.org/officeDocument/2006/relationships" xmlns:p="http://schemas.openxmlformats.org/presentationml/2006/main" show="0">
   <p:cSld>
     <p:spTree>
       <p:nvGrpSpPr>
@@ -16647,7 +16647,7 @@
 </file>
 
 <file path=ppt/slides/slide15.xml><?xml version="1.0" encoding="utf-8"?>
-<p:sld xmlns:a="http://schemas.openxmlformats.org/drawingml/2006/main" xmlns:r="http://schemas.openxmlformats.org/officeDocument/2006/relationships" xmlns:p="http://schemas.openxmlformats.org/presentationml/2006/main">
+<p:sld xmlns:a="http://schemas.openxmlformats.org/drawingml/2006/main" xmlns:r="http://schemas.openxmlformats.org/officeDocument/2006/relationships" xmlns:p="http://schemas.openxmlformats.org/presentationml/2006/main" show="0">
   <p:cSld>
     <p:spTree>
       <p:nvGrpSpPr>
@@ -17152,7 +17152,7 @@
 </file>
 
 <file path=ppt/slides/slide16.xml><?xml version="1.0" encoding="utf-8"?>
-<p:sld xmlns:a="http://schemas.openxmlformats.org/drawingml/2006/main" xmlns:r="http://schemas.openxmlformats.org/officeDocument/2006/relationships" xmlns:p="http://schemas.openxmlformats.org/presentationml/2006/main">
+<p:sld xmlns:a="http://schemas.openxmlformats.org/drawingml/2006/main" xmlns:r="http://schemas.openxmlformats.org/officeDocument/2006/relationships" xmlns:p="http://schemas.openxmlformats.org/presentationml/2006/main" show="0">
   <p:cSld>
     <p:spTree>
       <p:nvGrpSpPr>
@@ -17507,7 +17507,7 @@
 </file>
 
 <file path=ppt/slides/slide17.xml><?xml version="1.0" encoding="utf-8"?>
-<p:sld xmlns:a="http://schemas.openxmlformats.org/drawingml/2006/main" xmlns:r="http://schemas.openxmlformats.org/officeDocument/2006/relationships" xmlns:p="http://schemas.openxmlformats.org/presentationml/2006/main">
+<p:sld xmlns:a="http://schemas.openxmlformats.org/drawingml/2006/main" xmlns:r="http://schemas.openxmlformats.org/officeDocument/2006/relationships" xmlns:p="http://schemas.openxmlformats.org/presentationml/2006/main" show="0">
   <p:cSld>
     <p:spTree>
       <p:nvGrpSpPr>
@@ -17862,7 +17862,7 @@
 </file>
 
 <file path=ppt/slides/slide18.xml><?xml version="1.0" encoding="utf-8"?>
-<p:sld xmlns:a="http://schemas.openxmlformats.org/drawingml/2006/main" xmlns:r="http://schemas.openxmlformats.org/officeDocument/2006/relationships" xmlns:p="http://schemas.openxmlformats.org/presentationml/2006/main">
+<p:sld xmlns:a="http://schemas.openxmlformats.org/drawingml/2006/main" xmlns:r="http://schemas.openxmlformats.org/officeDocument/2006/relationships" xmlns:p="http://schemas.openxmlformats.org/presentationml/2006/main" show="0">
   <p:cSld>
     <p:spTree>
       <p:nvGrpSpPr>
@@ -18458,7 +18458,7 @@
 </file>
 
 <file path=ppt/slides/slide2.xml><?xml version="1.0" encoding="utf-8"?>
-<p:sld xmlns:a="http://schemas.openxmlformats.org/drawingml/2006/main" xmlns:r="http://schemas.openxmlformats.org/officeDocument/2006/relationships" xmlns:p="http://schemas.openxmlformats.org/presentationml/2006/main">
+<p:sld xmlns:a="http://schemas.openxmlformats.org/drawingml/2006/main" xmlns:r="http://schemas.openxmlformats.org/officeDocument/2006/relationships" xmlns:p="http://schemas.openxmlformats.org/presentationml/2006/main" show="0">
   <p:cSld>
     <p:spTree>
       <p:nvGrpSpPr>
@@ -18851,7 +18851,7 @@
 </file>
 
 <file path=ppt/slides/slide3.xml><?xml version="1.0" encoding="utf-8"?>
-<p:sld xmlns:a="http://schemas.openxmlformats.org/drawingml/2006/main" xmlns:r="http://schemas.openxmlformats.org/officeDocument/2006/relationships" xmlns:p="http://schemas.openxmlformats.org/presentationml/2006/main">
+<p:sld xmlns:a="http://schemas.openxmlformats.org/drawingml/2006/main" xmlns:r="http://schemas.openxmlformats.org/officeDocument/2006/relationships" xmlns:p="http://schemas.openxmlformats.org/presentationml/2006/main" show="0">
   <p:cSld>
     <p:spTree>
       <p:nvGrpSpPr>
@@ -20664,7 +20664,7 @@
 </file>
 
 <file path=ppt/slides/slide6.xml><?xml version="1.0" encoding="utf-8"?>
-<p:sld xmlns:a="http://schemas.openxmlformats.org/drawingml/2006/main" xmlns:r="http://schemas.openxmlformats.org/officeDocument/2006/relationships" xmlns:p="http://schemas.openxmlformats.org/presentationml/2006/main">
+<p:sld xmlns:a="http://schemas.openxmlformats.org/drawingml/2006/main" xmlns:r="http://schemas.openxmlformats.org/officeDocument/2006/relationships" xmlns:p="http://schemas.openxmlformats.org/presentationml/2006/main" show="0">
   <p:cSld>
     <p:spTree>
       <p:nvGrpSpPr>
@@ -21861,7 +21861,7 @@
 </file>
 
 <file path=ppt/slides/slide7.xml><?xml version="1.0" encoding="utf-8"?>
-<p:sld xmlns:a="http://schemas.openxmlformats.org/drawingml/2006/main" xmlns:r="http://schemas.openxmlformats.org/officeDocument/2006/relationships" xmlns:p="http://schemas.openxmlformats.org/presentationml/2006/main">
+<p:sld xmlns:a="http://schemas.openxmlformats.org/drawingml/2006/main" xmlns:r="http://schemas.openxmlformats.org/officeDocument/2006/relationships" xmlns:p="http://schemas.openxmlformats.org/presentationml/2006/main" show="0">
   <p:cSld>
     <p:spTree>
       <p:nvGrpSpPr>
@@ -22354,7 +22354,7 @@
 </file>
 
 <file path=ppt/slides/slide8.xml><?xml version="1.0" encoding="utf-8"?>
-<p:sld xmlns:a="http://schemas.openxmlformats.org/drawingml/2006/main" xmlns:r="http://schemas.openxmlformats.org/officeDocument/2006/relationships" xmlns:p="http://schemas.openxmlformats.org/presentationml/2006/main">
+<p:sld xmlns:a="http://schemas.openxmlformats.org/drawingml/2006/main" xmlns:r="http://schemas.openxmlformats.org/officeDocument/2006/relationships" xmlns:p="http://schemas.openxmlformats.org/presentationml/2006/main" show="0">
   <p:cSld>
     <p:spTree>
       <p:nvGrpSpPr>
@@ -22903,7 +22903,7 @@
 </file>
 
 <file path=ppt/slides/slide9.xml><?xml version="1.0" encoding="utf-8"?>
-<p:sld xmlns:a="http://schemas.openxmlformats.org/drawingml/2006/main" xmlns:r="http://schemas.openxmlformats.org/officeDocument/2006/relationships" xmlns:p="http://schemas.openxmlformats.org/presentationml/2006/main">
+<p:sld xmlns:a="http://schemas.openxmlformats.org/drawingml/2006/main" xmlns:r="http://schemas.openxmlformats.org/officeDocument/2006/relationships" xmlns:p="http://schemas.openxmlformats.org/presentationml/2006/main" show="0">
   <p:cSld>
     <p:spTree>
       <p:nvGrpSpPr>

</xml_diff>